<commit_message>
Powerpoint Low/High fidelity prototipe and feedback
</commit_message>
<xml_diff>
--- a/Powerpoint/Kavomat.pptx
+++ b/Powerpoint/Kavomat.pptx
@@ -9,9 +9,8 @@
     <p:sldId id="257" r:id="rId3"/>
     <p:sldId id="258" r:id="rId4"/>
     <p:sldId id="259" r:id="rId5"/>
-    <p:sldId id="260" r:id="rId6"/>
-    <p:sldId id="261" r:id="rId7"/>
-    <p:sldId id="262" r:id="rId8"/>
+    <p:sldId id="261" r:id="rId6"/>
+    <p:sldId id="262" r:id="rId7"/>
   </p:sldIdLst>
   <p:sldSz cx="12192000" cy="6858000"/>
   <p:notesSz cx="6858000" cy="9144000"/>
@@ -110,6 +109,11 @@
       </a:defRPr>
     </a:lvl9pPr>
   </p:defaultTextStyle>
+  <p:extLst>
+    <p:ext uri="{EFAFB233-063F-42B5-8137-9DF3F51BA10A}">
+      <p15:sldGuideLst xmlns:p15="http://schemas.microsoft.com/office/powerpoint/2012/main"/>
+    </p:ext>
+  </p:extLst>
 </p:presentation>
 </file>
 
@@ -513,7 +517,7 @@
           <a:p>
             <a:fld id="{A6BF203E-7674-4A94-9B47-7CBA4B395D6E}" type="datetimeFigureOut">
               <a:rPr lang="en-US" smtClean="0"/>
-              <a:t>11/30/2024</a:t>
+              <a:t>12/1/2024</a:t>
             </a:fld>
             <a:endParaRPr lang="en-US"/>
           </a:p>
@@ -711,7 +715,7 @@
           <a:p>
             <a:fld id="{A6BF203E-7674-4A94-9B47-7CBA4B395D6E}" type="datetimeFigureOut">
               <a:rPr lang="en-US" smtClean="0"/>
-              <a:t>11/30/2024</a:t>
+              <a:t>12/1/2024</a:t>
             </a:fld>
             <a:endParaRPr lang="en-US"/>
           </a:p>
@@ -919,7 +923,7 @@
           <a:p>
             <a:fld id="{A6BF203E-7674-4A94-9B47-7CBA4B395D6E}" type="datetimeFigureOut">
               <a:rPr lang="en-US" smtClean="0"/>
-              <a:t>11/30/2024</a:t>
+              <a:t>12/1/2024</a:t>
             </a:fld>
             <a:endParaRPr lang="en-US"/>
           </a:p>
@@ -1117,7 +1121,7 @@
           <a:p>
             <a:fld id="{A6BF203E-7674-4A94-9B47-7CBA4B395D6E}" type="datetimeFigureOut">
               <a:rPr lang="en-US" smtClean="0"/>
-              <a:t>11/30/2024</a:t>
+              <a:t>12/1/2024</a:t>
             </a:fld>
             <a:endParaRPr lang="en-US"/>
           </a:p>
@@ -1392,7 +1396,7 @@
           <a:p>
             <a:fld id="{A6BF203E-7674-4A94-9B47-7CBA4B395D6E}" type="datetimeFigureOut">
               <a:rPr lang="en-US" smtClean="0"/>
-              <a:t>11/30/2024</a:t>
+              <a:t>12/1/2024</a:t>
             </a:fld>
             <a:endParaRPr lang="en-US"/>
           </a:p>
@@ -1657,7 +1661,7 @@
           <a:p>
             <a:fld id="{A6BF203E-7674-4A94-9B47-7CBA4B395D6E}" type="datetimeFigureOut">
               <a:rPr lang="en-US" smtClean="0"/>
-              <a:t>11/30/2024</a:t>
+              <a:t>12/1/2024</a:t>
             </a:fld>
             <a:endParaRPr lang="en-US"/>
           </a:p>
@@ -2069,7 +2073,7 @@
           <a:p>
             <a:fld id="{A6BF203E-7674-4A94-9B47-7CBA4B395D6E}" type="datetimeFigureOut">
               <a:rPr lang="en-US" smtClean="0"/>
-              <a:t>11/30/2024</a:t>
+              <a:t>12/1/2024</a:t>
             </a:fld>
             <a:endParaRPr lang="en-US"/>
           </a:p>
@@ -2210,7 +2214,7 @@
           <a:p>
             <a:fld id="{A6BF203E-7674-4A94-9B47-7CBA4B395D6E}" type="datetimeFigureOut">
               <a:rPr lang="en-US" smtClean="0"/>
-              <a:t>11/30/2024</a:t>
+              <a:t>12/1/2024</a:t>
             </a:fld>
             <a:endParaRPr lang="en-US"/>
           </a:p>
@@ -2323,7 +2327,7 @@
           <a:p>
             <a:fld id="{A6BF203E-7674-4A94-9B47-7CBA4B395D6E}" type="datetimeFigureOut">
               <a:rPr lang="en-US" smtClean="0"/>
-              <a:t>11/30/2024</a:t>
+              <a:t>12/1/2024</a:t>
             </a:fld>
             <a:endParaRPr lang="en-US"/>
           </a:p>
@@ -2634,7 +2638,7 @@
           <a:p>
             <a:fld id="{A6BF203E-7674-4A94-9B47-7CBA4B395D6E}" type="datetimeFigureOut">
               <a:rPr lang="en-US" smtClean="0"/>
-              <a:t>11/30/2024</a:t>
+              <a:t>12/1/2024</a:t>
             </a:fld>
             <a:endParaRPr lang="en-US"/>
           </a:p>
@@ -2922,7 +2926,7 @@
           <a:p>
             <a:fld id="{A6BF203E-7674-4A94-9B47-7CBA4B395D6E}" type="datetimeFigureOut">
               <a:rPr lang="en-US" smtClean="0"/>
-              <a:t>11/30/2024</a:t>
+              <a:t>12/1/2024</a:t>
             </a:fld>
             <a:endParaRPr lang="en-US"/>
           </a:p>
@@ -3163,7 +3167,7 @@
           <a:p>
             <a:fld id="{A6BF203E-7674-4A94-9B47-7CBA4B395D6E}" type="datetimeFigureOut">
               <a:rPr lang="en-US" smtClean="0"/>
-              <a:t>11/30/2024</a:t>
+              <a:t>12/1/2024</a:t>
             </a:fld>
             <a:endParaRPr lang="en-US"/>
           </a:p>
@@ -3605,6 +3609,9 @@
               <a:rPr lang="en-US" dirty="0" err="1"/>
               <a:t>Kavomat</a:t>
             </a:r>
+            <a:br>
+              <a:rPr lang="en-US" dirty="0"/>
+            </a:br>
             <a:endParaRPr lang="en-US" dirty="0"/>
           </a:p>
         </p:txBody>
@@ -3627,10 +3634,68 @@
         </p:nvSpPr>
         <p:spPr/>
         <p:txBody>
-          <a:bodyPr/>
-          <a:lstStyle/>
-          <a:p>
-            <a:endParaRPr lang="en-US"/>
+          <a:bodyPr>
+            <a:normAutofit lnSpcReduction="10000"/>
+          </a:bodyPr>
+          <a:lstStyle/>
+          <a:p>
+            <a:endParaRPr lang="en-US" dirty="0"/>
+          </a:p>
+          <a:p>
+            <a:r>
+              <a:rPr lang="en-US" dirty="0" err="1"/>
+              <a:t>Skupina</a:t>
+            </a:r>
+            <a:r>
+              <a:rPr lang="en-US" dirty="0"/>
+              <a:t> 11</a:t>
+            </a:r>
+          </a:p>
+          <a:p>
+            <a:endParaRPr lang="en-US" dirty="0"/>
+          </a:p>
+          <a:p>
+            <a:r>
+              <a:rPr lang="es-ES" dirty="0"/>
+              <a:t>Anton </a:t>
+            </a:r>
+            <a:r>
+              <a:rPr lang="es-ES" dirty="0" err="1"/>
+              <a:t>Križnar</a:t>
+            </a:r>
+            <a:r>
+              <a:rPr lang="es-ES" dirty="0"/>
+              <a:t>, Alen </a:t>
+            </a:r>
+            <a:r>
+              <a:rPr lang="es-ES" dirty="0" err="1"/>
+              <a:t>Leban</a:t>
+            </a:r>
+            <a:r>
+              <a:rPr lang="es-ES" dirty="0"/>
+              <a:t>, </a:t>
+            </a:r>
+            <a:r>
+              <a:rPr lang="es-ES" dirty="0" err="1"/>
+              <a:t>Matjaž</a:t>
+            </a:r>
+            <a:r>
+              <a:rPr lang="es-ES" dirty="0"/>
+              <a:t> </a:t>
+            </a:r>
+            <a:r>
+              <a:rPr lang="es-ES" dirty="0" err="1"/>
+              <a:t>Madon</a:t>
+            </a:r>
+            <a:r>
+              <a:rPr lang="es-ES" dirty="0"/>
+              <a:t>, Lena </a:t>
+            </a:r>
+            <a:r>
+              <a:rPr lang="es-ES" dirty="0" err="1"/>
+              <a:t>Trnovec</a:t>
+            </a:r>
+            <a:endParaRPr lang="en-US" dirty="0"/>
           </a:p>
         </p:txBody>
       </p:sp>
@@ -3813,8 +3878,8 @@
           </a:xfrm>
         </p:spPr>
       </p:pic>
-      <mc:AlternateContent xmlns:mc="http://schemas.openxmlformats.org/markup-compatibility/2006">
-        <mc:Choice xmlns:p14="http://schemas.microsoft.com/office/powerpoint/2010/main" Requires="p14">
+      <mc:AlternateContent xmlns:mc="http://schemas.openxmlformats.org/markup-compatibility/2006" xmlns:p14="http://schemas.microsoft.com/office/powerpoint/2010/main">
+        <mc:Choice Requires="p14">
           <p:contentPart p14:bwMode="auto" r:id="rId3">
             <p14:nvContentPartPr>
               <p14:cNvPr id="6" name="Ink 5">
@@ -3833,7 +3898,7 @@
             </p14:xfrm>
           </p:contentPart>
         </mc:Choice>
-        <mc:Fallback>
+        <mc:Fallback xmlns="">
           <p:pic>
             <p:nvPicPr>
               <p:cNvPr id="6" name="Ink 5">
@@ -3912,12 +3977,14 @@
         </p:nvSpPr>
         <p:spPr/>
         <p:txBody>
-          <a:bodyPr/>
-          <a:lstStyle/>
-          <a:p>
-            <a:r>
-              <a:rPr lang="en-US" dirty="0"/>
-              <a:t>Low/Mid fidelity</a:t>
+          <a:bodyPr>
+            <a:normAutofit/>
+          </a:bodyPr>
+          <a:lstStyle/>
+          <a:p>
+            <a:r>
+              <a:rPr lang="en-US" sz="4000" dirty="0"/>
+              <a:t>Low/mid fidelity</a:t>
             </a:r>
           </a:p>
         </p:txBody>
@@ -3949,10 +4016,10 @@
       </p:sp>
       <p:pic>
         <p:nvPicPr>
-          <p:cNvPr id="8" name="Picture 7">
-            <a:extLst>
-              <a:ext uri="{FF2B5EF4-FFF2-40B4-BE49-F238E27FC236}">
-                <a16:creationId xmlns:a16="http://schemas.microsoft.com/office/drawing/2014/main" id="{636A94DB-3421-DE7A-0762-240B5A675246}"/>
+          <p:cNvPr id="5" name="Slika 4">
+            <a:extLst>
+              <a:ext uri="{FF2B5EF4-FFF2-40B4-BE49-F238E27FC236}">
+                <a16:creationId xmlns:a16="http://schemas.microsoft.com/office/drawing/2014/main" id="{61592896-688E-99FE-055F-6B5E8BAB407D}"/>
               </a:ext>
             </a:extLst>
           </p:cNvPr>
@@ -3969,8 +4036,8 @@
         </p:blipFill>
         <p:spPr>
           <a:xfrm>
-            <a:off x="1423722" y="235980"/>
-            <a:ext cx="8039599" cy="3262355"/>
+            <a:off x="9667630" y="1"/>
+            <a:ext cx="2524369" cy="3409742"/>
           </a:xfrm>
           <a:prstGeom prst="rect">
             <a:avLst/>
@@ -3979,10 +4046,10 @@
       </p:pic>
       <p:pic>
         <p:nvPicPr>
-          <p:cNvPr id="10" name="Picture 9">
-            <a:extLst>
-              <a:ext uri="{FF2B5EF4-FFF2-40B4-BE49-F238E27FC236}">
-                <a16:creationId xmlns:a16="http://schemas.microsoft.com/office/drawing/2014/main" id="{9BD3F930-B855-ADB5-90B3-A959F27A864B}"/>
+          <p:cNvPr id="7" name="Slika 6">
+            <a:extLst>
+              <a:ext uri="{FF2B5EF4-FFF2-40B4-BE49-F238E27FC236}">
+                <a16:creationId xmlns:a16="http://schemas.microsoft.com/office/drawing/2014/main" id="{398AA65C-B0CC-3AD5-4E0F-9F23290114BD}"/>
               </a:ext>
             </a:extLst>
           </p:cNvPr>
@@ -3999,8 +4066,248 @@
         </p:blipFill>
         <p:spPr>
           <a:xfrm>
-            <a:off x="2378750" y="3411707"/>
-            <a:ext cx="6297086" cy="3446293"/>
+            <a:off x="9667630" y="3449837"/>
+            <a:ext cx="2524369" cy="3408162"/>
+          </a:xfrm>
+          <a:prstGeom prst="rect">
+            <a:avLst/>
+          </a:prstGeom>
+        </p:spPr>
+      </p:pic>
+      <p:pic>
+        <p:nvPicPr>
+          <p:cNvPr id="11" name="Slika 10">
+            <a:extLst>
+              <a:ext uri="{FF2B5EF4-FFF2-40B4-BE49-F238E27FC236}">
+                <a16:creationId xmlns:a16="http://schemas.microsoft.com/office/drawing/2014/main" id="{D8758B42-5980-981B-CFB2-5BA946D340B3}"/>
+              </a:ext>
+            </a:extLst>
+          </p:cNvPr>
+          <p:cNvPicPr>
+            <a:picLocks noChangeAspect="1"/>
+          </p:cNvPicPr>
+          <p:nvPr/>
+        </p:nvPicPr>
+        <p:blipFill>
+          <a:blip r:embed="rId4"/>
+          <a:stretch>
+            <a:fillRect/>
+          </a:stretch>
+        </p:blipFill>
+        <p:spPr>
+          <a:xfrm>
+            <a:off x="7067809" y="0"/>
+            <a:ext cx="2549339" cy="3409742"/>
+          </a:xfrm>
+          <a:prstGeom prst="rect">
+            <a:avLst/>
+          </a:prstGeom>
+        </p:spPr>
+      </p:pic>
+      <p:pic>
+        <p:nvPicPr>
+          <p:cNvPr id="13" name="Slika 12">
+            <a:extLst>
+              <a:ext uri="{FF2B5EF4-FFF2-40B4-BE49-F238E27FC236}">
+                <a16:creationId xmlns:a16="http://schemas.microsoft.com/office/drawing/2014/main" id="{0E172B06-79E6-6E7B-3F9F-EF3360BB2552}"/>
+              </a:ext>
+            </a:extLst>
+          </p:cNvPr>
+          <p:cNvPicPr>
+            <a:picLocks noChangeAspect="1"/>
+          </p:cNvPicPr>
+          <p:nvPr/>
+        </p:nvPicPr>
+        <p:blipFill>
+          <a:blip r:embed="rId5"/>
+          <a:stretch>
+            <a:fillRect/>
+          </a:stretch>
+        </p:blipFill>
+        <p:spPr>
+          <a:xfrm>
+            <a:off x="7066353" y="3444448"/>
+            <a:ext cx="2550795" cy="3408161"/>
+          </a:xfrm>
+          <a:prstGeom prst="rect">
+            <a:avLst/>
+          </a:prstGeom>
+        </p:spPr>
+      </p:pic>
+      <p:pic>
+        <p:nvPicPr>
+          <p:cNvPr id="15" name="Slika 14">
+            <a:extLst>
+              <a:ext uri="{FF2B5EF4-FFF2-40B4-BE49-F238E27FC236}">
+                <a16:creationId xmlns:a16="http://schemas.microsoft.com/office/drawing/2014/main" id="{1ACCA30E-B7C4-D8E2-B51A-B3EC23FE5C42}"/>
+              </a:ext>
+            </a:extLst>
+          </p:cNvPr>
+          <p:cNvPicPr>
+            <a:picLocks noChangeAspect="1"/>
+          </p:cNvPicPr>
+          <p:nvPr/>
+        </p:nvPicPr>
+        <p:blipFill>
+          <a:blip r:embed="rId6"/>
+          <a:stretch>
+            <a:fillRect/>
+          </a:stretch>
+        </p:blipFill>
+        <p:spPr>
+          <a:xfrm>
+            <a:off x="4467987" y="-1797"/>
+            <a:ext cx="2549340" cy="3411539"/>
+          </a:xfrm>
+          <a:prstGeom prst="rect">
+            <a:avLst/>
+          </a:prstGeom>
+        </p:spPr>
+      </p:pic>
+      <p:pic>
+        <p:nvPicPr>
+          <p:cNvPr id="17" name="Slika 16">
+            <a:extLst>
+              <a:ext uri="{FF2B5EF4-FFF2-40B4-BE49-F238E27FC236}">
+                <a16:creationId xmlns:a16="http://schemas.microsoft.com/office/drawing/2014/main" id="{8F30C406-ED2E-23DF-58F2-DD98BD9B8EFF}"/>
+              </a:ext>
+            </a:extLst>
+          </p:cNvPr>
+          <p:cNvPicPr>
+            <a:picLocks noChangeAspect="1"/>
+          </p:cNvPicPr>
+          <p:nvPr/>
+        </p:nvPicPr>
+        <p:blipFill>
+          <a:blip r:embed="rId7"/>
+          <a:stretch>
+            <a:fillRect/>
+          </a:stretch>
+        </p:blipFill>
+        <p:spPr>
+          <a:xfrm>
+            <a:off x="4467987" y="3429000"/>
+            <a:ext cx="2524369" cy="3422157"/>
+          </a:xfrm>
+          <a:prstGeom prst="rect">
+            <a:avLst/>
+          </a:prstGeom>
+        </p:spPr>
+      </p:pic>
+      <p:pic>
+        <p:nvPicPr>
+          <p:cNvPr id="19" name="Slika 18">
+            <a:extLst>
+              <a:ext uri="{FF2B5EF4-FFF2-40B4-BE49-F238E27FC236}">
+                <a16:creationId xmlns:a16="http://schemas.microsoft.com/office/drawing/2014/main" id="{411E8F47-49EA-B5A3-7D14-06D98253896E}"/>
+              </a:ext>
+            </a:extLst>
+          </p:cNvPr>
+          <p:cNvPicPr>
+            <a:picLocks noChangeAspect="1"/>
+          </p:cNvPicPr>
+          <p:nvPr/>
+        </p:nvPicPr>
+        <p:blipFill>
+          <a:blip r:embed="rId8"/>
+          <a:stretch>
+            <a:fillRect/>
+          </a:stretch>
+        </p:blipFill>
+        <p:spPr>
+          <a:xfrm>
+            <a:off x="2284897" y="1990420"/>
+            <a:ext cx="2118505" cy="2861530"/>
+          </a:xfrm>
+          <a:prstGeom prst="rect">
+            <a:avLst/>
+          </a:prstGeom>
+        </p:spPr>
+      </p:pic>
+      <p:pic>
+        <p:nvPicPr>
+          <p:cNvPr id="21" name="Slika 20">
+            <a:extLst>
+              <a:ext uri="{FF2B5EF4-FFF2-40B4-BE49-F238E27FC236}">
+                <a16:creationId xmlns:a16="http://schemas.microsoft.com/office/drawing/2014/main" id="{0543A02D-42A2-0186-3BA5-1C26EE82C659}"/>
+              </a:ext>
+            </a:extLst>
+          </p:cNvPr>
+          <p:cNvPicPr>
+            <a:picLocks noChangeAspect="1"/>
+          </p:cNvPicPr>
+          <p:nvPr/>
+        </p:nvPicPr>
+        <p:blipFill>
+          <a:blip r:embed="rId9"/>
+          <a:stretch>
+            <a:fillRect/>
+          </a:stretch>
+        </p:blipFill>
+        <p:spPr>
+          <a:xfrm>
+            <a:off x="71339" y="1990420"/>
+            <a:ext cx="2123931" cy="2861530"/>
+          </a:xfrm>
+          <a:prstGeom prst="rect">
+            <a:avLst/>
+          </a:prstGeom>
+        </p:spPr>
+      </p:pic>
+      <p:pic>
+        <p:nvPicPr>
+          <p:cNvPr id="25" name="Slika 24">
+            <a:extLst>
+              <a:ext uri="{FF2B5EF4-FFF2-40B4-BE49-F238E27FC236}">
+                <a16:creationId xmlns:a16="http://schemas.microsoft.com/office/drawing/2014/main" id="{4EDDD1F2-BFD2-3A52-E5D3-6D7734DA5782}"/>
+              </a:ext>
+            </a:extLst>
+          </p:cNvPr>
+          <p:cNvPicPr>
+            <a:picLocks noChangeAspect="1"/>
+          </p:cNvPicPr>
+          <p:nvPr/>
+        </p:nvPicPr>
+        <p:blipFill>
+          <a:blip r:embed="rId10"/>
+          <a:stretch>
+            <a:fillRect/>
+          </a:stretch>
+        </p:blipFill>
+        <p:spPr>
+          <a:xfrm>
+            <a:off x="10292863" y="6452134"/>
+            <a:ext cx="1852245" cy="391207"/>
+          </a:xfrm>
+          <a:prstGeom prst="rect">
+            <a:avLst/>
+          </a:prstGeom>
+        </p:spPr>
+      </p:pic>
+      <p:pic>
+        <p:nvPicPr>
+          <p:cNvPr id="26" name="Slika 25">
+            <a:extLst>
+              <a:ext uri="{FF2B5EF4-FFF2-40B4-BE49-F238E27FC236}">
+                <a16:creationId xmlns:a16="http://schemas.microsoft.com/office/drawing/2014/main" id="{ED17E899-0502-86D5-6D9A-C21E3C9F1A0C}"/>
+              </a:ext>
+            </a:extLst>
+          </p:cNvPr>
+          <p:cNvPicPr>
+            <a:picLocks noChangeAspect="1"/>
+          </p:cNvPicPr>
+          <p:nvPr/>
+        </p:nvPicPr>
+        <p:blipFill>
+          <a:blip r:embed="rId10"/>
+          <a:stretch>
+            <a:fillRect/>
+          </a:stretch>
+        </p:blipFill>
+        <p:spPr>
+          <a:xfrm>
+            <a:off x="10292862" y="3001326"/>
+            <a:ext cx="1852245" cy="391207"/>
           </a:xfrm>
           <a:prstGeom prst="rect">
             <a:avLst/>
@@ -4042,93 +4349,6 @@
           <p:cNvPr id="2" name="Title 1">
             <a:extLst>
               <a:ext uri="{FF2B5EF4-FFF2-40B4-BE49-F238E27FC236}">
-                <a16:creationId xmlns:a16="http://schemas.microsoft.com/office/drawing/2014/main" id="{ADCE3124-8B6F-72FF-F2CF-88BA6DC4D7C9}"/>
-              </a:ext>
-            </a:extLst>
-          </p:cNvPr>
-          <p:cNvSpPr>
-            <a:spLocks noGrp="1"/>
-          </p:cNvSpPr>
-          <p:nvPr>
-            <p:ph type="title"/>
-          </p:nvPr>
-        </p:nvSpPr>
-        <p:spPr/>
-        <p:txBody>
-          <a:bodyPr/>
-          <a:lstStyle/>
-          <a:p>
-            <a:endParaRPr lang="en-US" dirty="0"/>
-          </a:p>
-        </p:txBody>
-      </p:sp>
-      <p:pic>
-        <p:nvPicPr>
-          <p:cNvPr id="11" name="Content Placeholder 10">
-            <a:extLst>
-              <a:ext uri="{FF2B5EF4-FFF2-40B4-BE49-F238E27FC236}">
-                <a16:creationId xmlns:a16="http://schemas.microsoft.com/office/drawing/2014/main" id="{1A81D610-3AE3-0EA2-6274-244D3A124C1B}"/>
-              </a:ext>
-            </a:extLst>
-          </p:cNvPr>
-          <p:cNvPicPr>
-            <a:picLocks noGrp="1" noChangeAspect="1"/>
-          </p:cNvPicPr>
-          <p:nvPr>
-            <p:ph idx="1"/>
-          </p:nvPr>
-        </p:nvPicPr>
-        <p:blipFill>
-          <a:blip r:embed="rId2"/>
-          <a:stretch>
-            <a:fillRect/>
-          </a:stretch>
-        </p:blipFill>
-        <p:spPr>
-          <a:xfrm>
-            <a:off x="2716206" y="1825625"/>
-            <a:ext cx="6759588" cy="4351338"/>
-          </a:xfrm>
-          <a:prstGeom prst="rect">
-            <a:avLst/>
-          </a:prstGeom>
-        </p:spPr>
-      </p:pic>
-    </p:spTree>
-    <p:extLst>
-      <p:ext uri="{BB962C8B-B14F-4D97-AF65-F5344CB8AC3E}">
-        <p14:creationId xmlns:p14="http://schemas.microsoft.com/office/powerpoint/2010/main" val="1083530808"/>
-      </p:ext>
-    </p:extLst>
-  </p:cSld>
-  <p:clrMapOvr>
-    <a:masterClrMapping/>
-  </p:clrMapOvr>
-</p:sld>
-</file>
-
-<file path=ppt/slides/slide6.xml><?xml version="1.0" encoding="utf-8"?>
-<p:sld xmlns:a="http://schemas.openxmlformats.org/drawingml/2006/main" xmlns:r="http://schemas.openxmlformats.org/officeDocument/2006/relationships" xmlns:p="http://schemas.openxmlformats.org/presentationml/2006/main">
-  <p:cSld>
-    <p:spTree>
-      <p:nvGrpSpPr>
-        <p:cNvPr id="1" name=""/>
-        <p:cNvGrpSpPr/>
-        <p:nvPr/>
-      </p:nvGrpSpPr>
-      <p:grpSpPr>
-        <a:xfrm>
-          <a:off x="0" y="0"/>
-          <a:ext cx="0" cy="0"/>
-          <a:chOff x="0" y="0"/>
-          <a:chExt cx="0" cy="0"/>
-        </a:xfrm>
-      </p:grpSpPr>
-      <p:sp>
-        <p:nvSpPr>
-          <p:cNvPr id="2" name="Title 1">
-            <a:extLst>
-              <a:ext uri="{FF2B5EF4-FFF2-40B4-BE49-F238E27FC236}">
                 <a16:creationId xmlns:a16="http://schemas.microsoft.com/office/drawing/2014/main" id="{DF29CFA6-83FC-545E-9356-1F9B5BA5FAB9}"/>
               </a:ext>
             </a:extLst>
@@ -4175,15 +4395,7 @@
           <a:p>
             <a:r>
               <a:rPr lang="en-US" dirty="0" err="1"/>
-              <a:t>Strnjenih</a:t>
-            </a:r>
-            <a:r>
-              <a:rPr lang="en-US" dirty="0"/>
-              <a:t>  5 </a:t>
-            </a:r>
-            <a:r>
-              <a:rPr lang="en-US" dirty="0" err="1"/>
-              <a:t>točk</a:t>
+              <a:t>ključna</a:t>
             </a:r>
             <a:r>
               <a:rPr lang="en-US" dirty="0"/>
@@ -4191,9 +4403,99 @@
             </a:r>
             <a:r>
               <a:rPr lang="en-US" dirty="0" err="1"/>
-              <a:t>feedbacka</a:t>
+              <a:t>prednost</a:t>
+            </a:r>
+            <a:r>
+              <a:rPr lang="en-US" dirty="0"/>
+              <a:t>: Most Popular</a:t>
+            </a:r>
+          </a:p>
+          <a:p>
+            <a:r>
+              <a:rPr lang="en-US" dirty="0" err="1"/>
+              <a:t>način</a:t>
+            </a:r>
+            <a:r>
+              <a:rPr lang="en-US" dirty="0"/>
+              <a:t> </a:t>
+            </a:r>
+            <a:r>
+              <a:rPr lang="en-US" dirty="0" err="1"/>
+              <a:t>prikaza</a:t>
+            </a:r>
+            <a:r>
+              <a:rPr lang="en-US" dirty="0"/>
+              <a:t> </a:t>
+            </a:r>
+            <a:r>
+              <a:rPr lang="en-US" dirty="0" err="1"/>
+              <a:t>podstrani</a:t>
             </a:r>
             <a:endParaRPr lang="en-US" dirty="0"/>
+          </a:p>
+          <a:p>
+            <a:r>
+              <a:rPr lang="en-US" dirty="0" err="1"/>
+              <a:t>intuitivni</a:t>
+            </a:r>
+            <a:r>
+              <a:rPr lang="en-US" dirty="0"/>
+              <a:t> </a:t>
+            </a:r>
+            <a:r>
+              <a:rPr lang="en-US" dirty="0" err="1"/>
+              <a:t>načini</a:t>
+            </a:r>
+            <a:r>
+              <a:rPr lang="en-US" dirty="0"/>
+              <a:t> </a:t>
+            </a:r>
+            <a:r>
+              <a:rPr lang="en-US" dirty="0" err="1"/>
+              <a:t>navigacije</a:t>
+            </a:r>
+            <a:endParaRPr lang="en-US" dirty="0"/>
+          </a:p>
+          <a:p>
+            <a:r>
+              <a:rPr lang="en-US" dirty="0" err="1"/>
+              <a:t>pomembno</a:t>
+            </a:r>
+            <a:r>
+              <a:rPr lang="en-US" dirty="0"/>
+              <a:t> dobro </a:t>
+            </a:r>
+            <a:r>
+              <a:rPr lang="en-US" dirty="0" err="1"/>
+              <a:t>definirati</a:t>
+            </a:r>
+            <a:r>
+              <a:rPr lang="en-US" dirty="0"/>
+              <a:t> </a:t>
+            </a:r>
+            <a:r>
+              <a:rPr lang="en-US" dirty="0" err="1"/>
+              <a:t>podkategorije</a:t>
+            </a:r>
+            <a:endParaRPr lang="en-US" dirty="0"/>
+          </a:p>
+          <a:p>
+            <a:r>
+              <a:rPr lang="en-US" dirty="0" err="1"/>
+              <a:t>izključitev</a:t>
+            </a:r>
+            <a:r>
+              <a:rPr lang="en-US" dirty="0"/>
+              <a:t> </a:t>
+            </a:r>
+            <a:r>
+              <a:rPr lang="en-US" dirty="0" err="1"/>
+              <a:t>alternativnega</a:t>
+            </a:r>
+            <a:r>
+              <a:rPr lang="en-US" dirty="0"/>
+              <a:t> UI</a:t>
+            </a:r>
           </a:p>
         </p:txBody>
       </p:sp>
@@ -4227,8 +4529,8 @@
           </a:prstGeom>
         </p:spPr>
       </p:pic>
-      <mc:AlternateContent xmlns:mc="http://schemas.openxmlformats.org/markup-compatibility/2006">
-        <mc:Choice xmlns:p14="http://schemas.microsoft.com/office/powerpoint/2010/main" Requires="p14">
+      <mc:AlternateContent xmlns:mc="http://schemas.openxmlformats.org/markup-compatibility/2006" xmlns:p14="http://schemas.microsoft.com/office/powerpoint/2010/main">
+        <mc:Choice Requires="p14">
           <p:contentPart p14:bwMode="auto" r:id="rId3">
             <p14:nvContentPartPr>
               <p14:cNvPr id="8" name="Ink 7">
@@ -4247,7 +4549,7 @@
             </p14:xfrm>
           </p:contentPart>
         </mc:Choice>
-        <mc:Fallback>
+        <mc:Fallback xmlns="">
           <p:pic>
             <p:nvPicPr>
               <p:cNvPr id="8" name="Ink 7">
@@ -4298,8 +4600,8 @@
             <a:chExt cx="1205280" cy="758520"/>
           </a:xfrm>
         </p:grpSpPr>
-        <mc:AlternateContent xmlns:mc="http://schemas.openxmlformats.org/markup-compatibility/2006">
-          <mc:Choice xmlns:p14="http://schemas.microsoft.com/office/powerpoint/2010/main" Requires="p14">
+        <mc:AlternateContent xmlns:mc="http://schemas.openxmlformats.org/markup-compatibility/2006" xmlns:p14="http://schemas.microsoft.com/office/powerpoint/2010/main">
+          <mc:Choice Requires="p14">
             <p:contentPart p14:bwMode="auto" r:id="rId5">
               <p14:nvContentPartPr>
                 <p14:cNvPr id="9" name="Ink 8">
@@ -4318,7 +4620,7 @@
               </p14:xfrm>
             </p:contentPart>
           </mc:Choice>
-          <mc:Fallback>
+          <mc:Fallback xmlns="">
             <p:pic>
               <p:nvPicPr>
                 <p:cNvPr id="9" name="Ink 8">
@@ -4349,8 +4651,8 @@
             </p:pic>
           </mc:Fallback>
         </mc:AlternateContent>
-        <mc:AlternateContent xmlns:mc="http://schemas.openxmlformats.org/markup-compatibility/2006">
-          <mc:Choice xmlns:p14="http://schemas.microsoft.com/office/powerpoint/2010/main" Requires="p14">
+        <mc:AlternateContent xmlns:mc="http://schemas.openxmlformats.org/markup-compatibility/2006" xmlns:p14="http://schemas.microsoft.com/office/powerpoint/2010/main">
+          <mc:Choice Requires="p14">
             <p:contentPart p14:bwMode="auto" r:id="rId7">
               <p14:nvContentPartPr>
                 <p14:cNvPr id="10" name="Ink 9">
@@ -4369,7 +4671,7 @@
               </p14:xfrm>
             </p:contentPart>
           </mc:Choice>
-          <mc:Fallback>
+          <mc:Fallback xmlns="">
             <p:pic>
               <p:nvPicPr>
                 <p:cNvPr id="10" name="Ink 9">
@@ -4400,8 +4702,8 @@
             </p:pic>
           </mc:Fallback>
         </mc:AlternateContent>
-        <mc:AlternateContent xmlns:mc="http://schemas.openxmlformats.org/markup-compatibility/2006">
-          <mc:Choice xmlns:p14="http://schemas.microsoft.com/office/powerpoint/2010/main" Requires="p14">
+        <mc:AlternateContent xmlns:mc="http://schemas.openxmlformats.org/markup-compatibility/2006" xmlns:p14="http://schemas.microsoft.com/office/powerpoint/2010/main">
+          <mc:Choice Requires="p14">
             <p:contentPart p14:bwMode="auto" r:id="rId9">
               <p14:nvContentPartPr>
                 <p14:cNvPr id="11" name="Ink 10">
@@ -4420,7 +4722,7 @@
               </p14:xfrm>
             </p:contentPart>
           </mc:Choice>
-          <mc:Fallback>
+          <mc:Fallback xmlns="">
             <p:pic>
               <p:nvPicPr>
                 <p:cNvPr id="11" name="Ink 10">
@@ -4451,8 +4753,8 @@
             </p:pic>
           </mc:Fallback>
         </mc:AlternateContent>
-        <mc:AlternateContent xmlns:mc="http://schemas.openxmlformats.org/markup-compatibility/2006">
-          <mc:Choice xmlns:p14="http://schemas.microsoft.com/office/powerpoint/2010/main" Requires="p14">
+        <mc:AlternateContent xmlns:mc="http://schemas.openxmlformats.org/markup-compatibility/2006" xmlns:p14="http://schemas.microsoft.com/office/powerpoint/2010/main">
+          <mc:Choice Requires="p14">
             <p:contentPart p14:bwMode="auto" r:id="rId11">
               <p14:nvContentPartPr>
                 <p14:cNvPr id="12" name="Ink 11">
@@ -4471,7 +4773,7 @@
               </p14:xfrm>
             </p:contentPart>
           </mc:Choice>
-          <mc:Fallback>
+          <mc:Fallback xmlns="">
             <p:pic>
               <p:nvPicPr>
                 <p:cNvPr id="12" name="Ink 11">
@@ -4523,8 +4825,8 @@
             <a:chExt cx="1009800" cy="696960"/>
           </a:xfrm>
         </p:grpSpPr>
-        <mc:AlternateContent xmlns:mc="http://schemas.openxmlformats.org/markup-compatibility/2006">
-          <mc:Choice xmlns:p14="http://schemas.microsoft.com/office/powerpoint/2010/main" Requires="p14">
+        <mc:AlternateContent xmlns:mc="http://schemas.openxmlformats.org/markup-compatibility/2006" xmlns:p14="http://schemas.microsoft.com/office/powerpoint/2010/main">
+          <mc:Choice Requires="p14">
             <p:contentPart p14:bwMode="auto" r:id="rId13">
               <p14:nvContentPartPr>
                 <p14:cNvPr id="13" name="Ink 12">
@@ -4543,7 +4845,7 @@
               </p14:xfrm>
             </p:contentPart>
           </mc:Choice>
-          <mc:Fallback>
+          <mc:Fallback xmlns="">
             <p:pic>
               <p:nvPicPr>
                 <p:cNvPr id="13" name="Ink 12">
@@ -4574,8 +4876,8 @@
             </p:pic>
           </mc:Fallback>
         </mc:AlternateContent>
-        <mc:AlternateContent xmlns:mc="http://schemas.openxmlformats.org/markup-compatibility/2006">
-          <mc:Choice xmlns:p14="http://schemas.microsoft.com/office/powerpoint/2010/main" Requires="p14">
+        <mc:AlternateContent xmlns:mc="http://schemas.openxmlformats.org/markup-compatibility/2006" xmlns:p14="http://schemas.microsoft.com/office/powerpoint/2010/main">
+          <mc:Choice Requires="p14">
             <p:contentPart p14:bwMode="auto" r:id="rId15">
               <p14:nvContentPartPr>
                 <p14:cNvPr id="14" name="Ink 13">
@@ -4594,7 +4896,7 @@
               </p14:xfrm>
             </p:contentPart>
           </mc:Choice>
-          <mc:Fallback>
+          <mc:Fallback xmlns="">
             <p:pic>
               <p:nvPicPr>
                 <p:cNvPr id="14" name="Ink 13">
@@ -4625,8 +4927,8 @@
             </p:pic>
           </mc:Fallback>
         </mc:AlternateContent>
-        <mc:AlternateContent xmlns:mc="http://schemas.openxmlformats.org/markup-compatibility/2006">
-          <mc:Choice xmlns:p14="http://schemas.microsoft.com/office/powerpoint/2010/main" Requires="p14">
+        <mc:AlternateContent xmlns:mc="http://schemas.openxmlformats.org/markup-compatibility/2006" xmlns:p14="http://schemas.microsoft.com/office/powerpoint/2010/main">
+          <mc:Choice Requires="p14">
             <p:contentPart p14:bwMode="auto" r:id="rId17">
               <p14:nvContentPartPr>
                 <p14:cNvPr id="15" name="Ink 14">
@@ -4645,7 +4947,7 @@
               </p14:xfrm>
             </p:contentPart>
           </mc:Choice>
-          <mc:Fallback>
+          <mc:Fallback xmlns="">
             <p:pic>
               <p:nvPicPr>
                 <p:cNvPr id="15" name="Ink 14">
@@ -4690,7 +4992,7 @@
 </p:sld>
 </file>
 
-<file path=ppt/slides/slide7.xml><?xml version="1.0" encoding="utf-8"?>
+<file path=ppt/slides/slide6.xml><?xml version="1.0" encoding="utf-8"?>
 <p:sld xmlns:a="http://schemas.openxmlformats.org/drawingml/2006/main" xmlns:r="http://schemas.openxmlformats.org/officeDocument/2006/relationships" xmlns:p="http://schemas.openxmlformats.org/presentationml/2006/main">
   <p:cSld>
     <p:spTree>
@@ -4789,14 +5091,13 @@
         </p:nvPicPr>
         <p:blipFill>
           <a:blip r:embed="rId3"/>
-          <a:stretch>
-            <a:fillRect/>
-          </a:stretch>
+          <a:srcRect l="1895" t="939" r="2315" b="1718"/>
+          <a:stretch/>
         </p:blipFill>
         <p:spPr>
           <a:xfrm>
-            <a:off x="7401214" y="173346"/>
-            <a:ext cx="4120226" cy="6511308"/>
+            <a:off x="7313245" y="184555"/>
+            <a:ext cx="4040555" cy="6488889"/>
           </a:xfrm>
           <a:prstGeom prst="rect">
             <a:avLst/>

</xml_diff>